<commit_message>
Idk cloned or sm?
</commit_message>
<xml_diff>
--- a/d20.pptx
+++ b/d20.pptx
@@ -107,6 +107,11 @@
       </a:defRPr>
     </a:lvl9pPr>
   </p:defaultTextStyle>
+  <p:extLst>
+    <p:ext uri="{EFAFB233-063F-42B5-8137-9DF3F51BA10A}">
+      <p15:sldGuideLst xmlns:p15="http://schemas.microsoft.com/office/powerpoint/2012/main"/>
+    </p:ext>
+  </p:extLst>
 </p:presentation>
 </file>
 
@@ -259,7 +264,7 @@
           <a:p>
             <a:fld id="{B137812A-0D9B-4138-8130-9BF321ECE304}" type="datetimeFigureOut">
               <a:rPr lang="en-GB" smtClean="0"/>
-              <a:t>19/05/2025</a:t>
+              <a:t>20/05/2025</a:t>
             </a:fld>
             <a:endParaRPr lang="en-GB"/>
           </a:p>
@@ -459,7 +464,7 @@
           <a:p>
             <a:fld id="{B137812A-0D9B-4138-8130-9BF321ECE304}" type="datetimeFigureOut">
               <a:rPr lang="en-GB" smtClean="0"/>
-              <a:t>19/05/2025</a:t>
+              <a:t>20/05/2025</a:t>
             </a:fld>
             <a:endParaRPr lang="en-GB"/>
           </a:p>
@@ -669,7 +674,7 @@
           <a:p>
             <a:fld id="{B137812A-0D9B-4138-8130-9BF321ECE304}" type="datetimeFigureOut">
               <a:rPr lang="en-GB" smtClean="0"/>
-              <a:t>19/05/2025</a:t>
+              <a:t>20/05/2025</a:t>
             </a:fld>
             <a:endParaRPr lang="en-GB"/>
           </a:p>
@@ -869,7 +874,7 @@
           <a:p>
             <a:fld id="{B137812A-0D9B-4138-8130-9BF321ECE304}" type="datetimeFigureOut">
               <a:rPr lang="en-GB" smtClean="0"/>
-              <a:t>19/05/2025</a:t>
+              <a:t>20/05/2025</a:t>
             </a:fld>
             <a:endParaRPr lang="en-GB"/>
           </a:p>
@@ -1145,7 +1150,7 @@
           <a:p>
             <a:fld id="{B137812A-0D9B-4138-8130-9BF321ECE304}" type="datetimeFigureOut">
               <a:rPr lang="en-GB" smtClean="0"/>
-              <a:t>19/05/2025</a:t>
+              <a:t>20/05/2025</a:t>
             </a:fld>
             <a:endParaRPr lang="en-GB"/>
           </a:p>
@@ -1413,7 +1418,7 @@
           <a:p>
             <a:fld id="{B137812A-0D9B-4138-8130-9BF321ECE304}" type="datetimeFigureOut">
               <a:rPr lang="en-GB" smtClean="0"/>
-              <a:t>19/05/2025</a:t>
+              <a:t>20/05/2025</a:t>
             </a:fld>
             <a:endParaRPr lang="en-GB"/>
           </a:p>
@@ -1828,7 +1833,7 @@
           <a:p>
             <a:fld id="{B137812A-0D9B-4138-8130-9BF321ECE304}" type="datetimeFigureOut">
               <a:rPr lang="en-GB" smtClean="0"/>
-              <a:t>19/05/2025</a:t>
+              <a:t>20/05/2025</a:t>
             </a:fld>
             <a:endParaRPr lang="en-GB"/>
           </a:p>
@@ -1970,7 +1975,7 @@
           <a:p>
             <a:fld id="{B137812A-0D9B-4138-8130-9BF321ECE304}" type="datetimeFigureOut">
               <a:rPr lang="en-GB" smtClean="0"/>
-              <a:t>19/05/2025</a:t>
+              <a:t>20/05/2025</a:t>
             </a:fld>
             <a:endParaRPr lang="en-GB"/>
           </a:p>
@@ -2083,7 +2088,7 @@
           <a:p>
             <a:fld id="{B137812A-0D9B-4138-8130-9BF321ECE304}" type="datetimeFigureOut">
               <a:rPr lang="en-GB" smtClean="0"/>
-              <a:t>19/05/2025</a:t>
+              <a:t>20/05/2025</a:t>
             </a:fld>
             <a:endParaRPr lang="en-GB"/>
           </a:p>
@@ -2396,7 +2401,7 @@
           <a:p>
             <a:fld id="{B137812A-0D9B-4138-8130-9BF321ECE304}" type="datetimeFigureOut">
               <a:rPr lang="en-GB" smtClean="0"/>
-              <a:t>19/05/2025</a:t>
+              <a:t>20/05/2025</a:t>
             </a:fld>
             <a:endParaRPr lang="en-GB"/>
           </a:p>
@@ -2685,7 +2690,7 @@
           <a:p>
             <a:fld id="{B137812A-0D9B-4138-8130-9BF321ECE304}" type="datetimeFigureOut">
               <a:rPr lang="en-GB" smtClean="0"/>
-              <a:t>19/05/2025</a:t>
+              <a:t>20/05/2025</a:t>
             </a:fld>
             <a:endParaRPr lang="en-GB"/>
           </a:p>
@@ -2928,7 +2933,7 @@
           <a:p>
             <a:fld id="{B137812A-0D9B-4138-8130-9BF321ECE304}" type="datetimeFigureOut">
               <a:rPr lang="en-GB" smtClean="0"/>
-              <a:t>19/05/2025</a:t>
+              <a:t>20/05/2025</a:t>
             </a:fld>
             <a:endParaRPr lang="en-GB"/>
           </a:p>
@@ -3374,7 +3379,7 @@
           <a:p>
             <a:r>
               <a:rPr lang="en-GB" dirty="0"/>
-              <a:t>d20: Chi-squared values</a:t>
+              <a:t>d20: Chi-squared values, average, total rolls</a:t>
             </a:r>
           </a:p>
         </p:txBody>
@@ -3458,19 +3463,25 @@
           <a:p>
             <a:r>
               <a:rPr lang="en-GB" dirty="0"/>
-              <a:t>Average roll: 10.62</a:t>
+              <a:t>Average roll: 10.50</a:t>
             </a:r>
           </a:p>
           <a:p>
             <a:r>
               <a:rPr lang="en-GB" dirty="0"/>
-              <a:t>Chi-squared statistic: 14.15</a:t>
+              <a:t>Chi-squared statistic: 24.09</a:t>
             </a:r>
           </a:p>
           <a:p>
             <a:r>
               <a:rPr lang="en-GB" dirty="0"/>
-              <a:t>P-value: 0.7749</a:t>
+              <a:t>P-value: 0.1927</a:t>
+            </a:r>
+          </a:p>
+          <a:p>
+            <a:r>
+              <a:rPr lang="en-GB" dirty="0"/>
+              <a:t>Total Rolls: 2000</a:t>
             </a:r>
           </a:p>
         </p:txBody>
@@ -3512,6 +3523,20 @@
               <a:rPr lang="en-GB" dirty="0"/>
               <a:t>P-value: 0.0782</a:t>
             </a:r>
+          </a:p>
+          <a:p>
+            <a:r>
+              <a:rPr lang="en-GB" dirty="0"/>
+              <a:t>Total Rolls</a:t>
+            </a:r>
+            <a:r>
+              <a:rPr lang="en-GB"/>
+              <a:t>: 1000</a:t>
+            </a:r>
+            <a:endParaRPr lang="en-GB" dirty="0"/>
+          </a:p>
+          <a:p>
+            <a:endParaRPr lang="en-GB" dirty="0"/>
           </a:p>
         </p:txBody>
       </p:sp>
@@ -3660,10 +3685,10 @@
       </p:sp>
       <p:pic>
         <p:nvPicPr>
-          <p:cNvPr id="10" name="Content Placeholder 9">
-            <a:extLst>
-              <a:ext uri="{FF2B5EF4-FFF2-40B4-BE49-F238E27FC236}">
-                <a16:creationId xmlns:a16="http://schemas.microsoft.com/office/drawing/2014/main" id="{041124BA-D1D7-358F-3E85-B16AA8F8D8F4}"/>
+          <p:cNvPr id="9" name="Content Placeholder 8">
+            <a:extLst>
+              <a:ext uri="{FF2B5EF4-FFF2-40B4-BE49-F238E27FC236}">
+                <a16:creationId xmlns:a16="http://schemas.microsoft.com/office/drawing/2014/main" id="{CA5251AA-EEF4-2972-A918-D1DC4E9F4420}"/>
               </a:ext>
             </a:extLst>
           </p:cNvPr>
@@ -3682,8 +3707,8 @@
         </p:blipFill>
         <p:spPr>
           <a:xfrm>
-            <a:off x="6392420" y="2505075"/>
-            <a:ext cx="4742747" cy="3684588"/>
+            <a:off x="6433156" y="2505075"/>
+            <a:ext cx="4661275" cy="3684588"/>
           </a:xfrm>
         </p:spPr>
       </p:pic>
@@ -3838,10 +3863,10 @@
       </p:sp>
       <p:pic>
         <p:nvPicPr>
-          <p:cNvPr id="10" name="Content Placeholder 9">
-            <a:extLst>
-              <a:ext uri="{FF2B5EF4-FFF2-40B4-BE49-F238E27FC236}">
-                <a16:creationId xmlns:a16="http://schemas.microsoft.com/office/drawing/2014/main" id="{C142563C-F776-E5E1-6A2D-A2EFCA47DCA1}"/>
+          <p:cNvPr id="11" name="Content Placeholder 10">
+            <a:extLst>
+              <a:ext uri="{FF2B5EF4-FFF2-40B4-BE49-F238E27FC236}">
+                <a16:creationId xmlns:a16="http://schemas.microsoft.com/office/drawing/2014/main" id="{50E36462-CC7D-3560-D8D4-D5A48436399F}"/>
               </a:ext>
             </a:extLst>
           </p:cNvPr>
@@ -3854,14 +3879,18 @@
         </p:nvPicPr>
         <p:blipFill>
           <a:blip r:embed="rId3"/>
-          <a:srcRect b="1832"/>
-          <a:stretch/>
+          <a:stretch>
+            <a:fillRect/>
+          </a:stretch>
         </p:blipFill>
         <p:spPr>
           <a:xfrm>
-            <a:off x="6172200" y="3038328"/>
-            <a:ext cx="5183188" cy="2570122"/>
+            <a:off x="6172200" y="3070777"/>
+            <a:ext cx="5183188" cy="2553183"/>
           </a:xfrm>
+          <a:prstGeom prst="rect">
+            <a:avLst/>
+          </a:prstGeom>
         </p:spPr>
       </p:pic>
     </p:spTree>
@@ -4015,10 +4044,10 @@
       </p:sp>
       <p:pic>
         <p:nvPicPr>
-          <p:cNvPr id="10" name="Content Placeholder 9">
-            <a:extLst>
-              <a:ext uri="{FF2B5EF4-FFF2-40B4-BE49-F238E27FC236}">
-                <a16:creationId xmlns:a16="http://schemas.microsoft.com/office/drawing/2014/main" id="{3F1D60F1-1501-69E4-5D9A-43B5BB9B928A}"/>
+          <p:cNvPr id="11" name="Content Placeholder 10">
+            <a:extLst>
+              <a:ext uri="{FF2B5EF4-FFF2-40B4-BE49-F238E27FC236}">
+                <a16:creationId xmlns:a16="http://schemas.microsoft.com/office/drawing/2014/main" id="{EBA9FDF9-01D6-282A-ACA7-0E67B522EA96}"/>
               </a:ext>
             </a:extLst>
           </p:cNvPr>
@@ -4037,9 +4066,12 @@
         </p:blipFill>
         <p:spPr>
           <a:xfrm>
-            <a:off x="6172200" y="3329054"/>
-            <a:ext cx="5183188" cy="2036629"/>
+            <a:off x="6172200" y="3343719"/>
+            <a:ext cx="5183188" cy="2007300"/>
           </a:xfrm>
+          <a:prstGeom prst="rect">
+            <a:avLst/>
+          </a:prstGeom>
         </p:spPr>
       </p:pic>
     </p:spTree>

</xml_diff>